<commit_message>
Other materials - Feedback
</commit_message>
<xml_diff>
--- a/Big Data + Business Intelligence via Azure/PPT/Data science and Cloud.pptx
+++ b/Big Data + Business Intelligence via Azure/PPT/Data science and Cloud.pptx
@@ -14952,7 +14952,7 @@
           <a:p>
             <a:fld id="{25D3C1E8-A4F4-4722-AB16-897F83A7C59F}" type="datetimeFigureOut">
               <a:rPr lang="en-US" smtClean="0"/>
-              <a:t>4/27/2019</a:t>
+              <a:t>2/28/2020</a:t>
             </a:fld>
             <a:endParaRPr lang="en-US"/>
           </a:p>
@@ -16054,7 +16054,7 @@
           <a:p>
             <a:fld id="{A643D7BA-99BF-4038-8F6C-FBBEE1A9CE38}" type="datetimeFigureOut">
               <a:rPr lang="en-US" smtClean="0"/>
-              <a:t>4/27/2019</a:t>
+              <a:t>2/28/2020</a:t>
             </a:fld>
             <a:endParaRPr lang="en-US"/>
           </a:p>
@@ -16252,7 +16252,7 @@
           <a:p>
             <a:fld id="{A643D7BA-99BF-4038-8F6C-FBBEE1A9CE38}" type="datetimeFigureOut">
               <a:rPr lang="en-US" smtClean="0"/>
-              <a:t>4/27/2019</a:t>
+              <a:t>2/28/2020</a:t>
             </a:fld>
             <a:endParaRPr lang="en-US"/>
           </a:p>
@@ -16460,7 +16460,7 @@
           <a:p>
             <a:fld id="{A643D7BA-99BF-4038-8F6C-FBBEE1A9CE38}" type="datetimeFigureOut">
               <a:rPr lang="en-US" smtClean="0"/>
-              <a:t>4/27/2019</a:t>
+              <a:t>2/28/2020</a:t>
             </a:fld>
             <a:endParaRPr lang="en-US"/>
           </a:p>
@@ -16729,7 +16729,7 @@
           <a:p>
             <a:fld id="{A643D7BA-99BF-4038-8F6C-FBBEE1A9CE38}" type="datetimeFigureOut">
               <a:rPr lang="en-US" smtClean="0"/>
-              <a:t>4/27/2019</a:t>
+              <a:t>2/28/2020</a:t>
             </a:fld>
             <a:endParaRPr lang="en-US"/>
           </a:p>
@@ -16899,7 +16899,7 @@
           <a:p>
             <a:fld id="{A643D7BA-99BF-4038-8F6C-FBBEE1A9CE38}" type="datetimeFigureOut">
               <a:rPr lang="en-US" smtClean="0"/>
-              <a:t>4/27/2019</a:t>
+              <a:t>2/28/2020</a:t>
             </a:fld>
             <a:endParaRPr lang="en-US"/>
           </a:p>
@@ -17156,7 +17156,7 @@
           <a:p>
             <a:fld id="{A643D7BA-99BF-4038-8F6C-FBBEE1A9CE38}" type="datetimeFigureOut">
               <a:rPr lang="en-US" smtClean="0"/>
-              <a:t>4/27/2019</a:t>
+              <a:t>2/28/2020</a:t>
             </a:fld>
             <a:endParaRPr lang="en-US"/>
           </a:p>
@@ -17388,7 +17388,7 @@
           <a:p>
             <a:fld id="{A643D7BA-99BF-4038-8F6C-FBBEE1A9CE38}" type="datetimeFigureOut">
               <a:rPr lang="en-US" smtClean="0"/>
-              <a:t>4/27/2019</a:t>
+              <a:t>2/28/2020</a:t>
             </a:fld>
             <a:endParaRPr lang="en-US"/>
           </a:p>
@@ -17781,7 +17781,7 @@
           <a:p>
             <a:fld id="{A643D7BA-99BF-4038-8F6C-FBBEE1A9CE38}" type="datetimeFigureOut">
               <a:rPr lang="en-US" smtClean="0"/>
-              <a:t>4/27/2019</a:t>
+              <a:t>2/28/2020</a:t>
             </a:fld>
             <a:endParaRPr lang="en-US"/>
           </a:p>
@@ -17899,7 +17899,7 @@
           <a:p>
             <a:fld id="{A643D7BA-99BF-4038-8F6C-FBBEE1A9CE38}" type="datetimeFigureOut">
               <a:rPr lang="en-US" smtClean="0"/>
-              <a:t>4/27/2019</a:t>
+              <a:t>2/28/2020</a:t>
             </a:fld>
             <a:endParaRPr lang="en-US"/>
           </a:p>
@@ -17994,7 +17994,7 @@
           <a:p>
             <a:fld id="{A643D7BA-99BF-4038-8F6C-FBBEE1A9CE38}" type="datetimeFigureOut">
               <a:rPr lang="en-US" smtClean="0"/>
-              <a:t>4/27/2019</a:t>
+              <a:t>2/28/2020</a:t>
             </a:fld>
             <a:endParaRPr lang="en-US"/>
           </a:p>
@@ -18267,7 +18267,7 @@
           <a:p>
             <a:fld id="{A643D7BA-99BF-4038-8F6C-FBBEE1A9CE38}" type="datetimeFigureOut">
               <a:rPr lang="en-US" smtClean="0"/>
-              <a:t>4/27/2019</a:t>
+              <a:t>2/28/2020</a:t>
             </a:fld>
             <a:endParaRPr lang="en-US"/>
           </a:p>
@@ -18453,7 +18453,7 @@
           <a:p>
             <a:fld id="{A643D7BA-99BF-4038-8F6C-FBBEE1A9CE38}" type="datetimeFigureOut">
               <a:rPr lang="en-US" smtClean="0"/>
-              <a:t>4/27/2019</a:t>
+              <a:t>2/28/2020</a:t>
             </a:fld>
             <a:endParaRPr lang="en-US"/>
           </a:p>
@@ -18746,7 +18746,7 @@
           <a:p>
             <a:fld id="{A643D7BA-99BF-4038-8F6C-FBBEE1A9CE38}" type="datetimeFigureOut">
               <a:rPr lang="en-US" smtClean="0"/>
-              <a:t>4/27/2019</a:t>
+              <a:t>2/28/2020</a:t>
             </a:fld>
             <a:endParaRPr lang="en-US"/>
           </a:p>
@@ -19027,7 +19027,7 @@
           <a:p>
             <a:fld id="{A643D7BA-99BF-4038-8F6C-FBBEE1A9CE38}" type="datetimeFigureOut">
               <a:rPr lang="en-US" smtClean="0"/>
-              <a:t>4/27/2019</a:t>
+              <a:t>2/28/2020</a:t>
             </a:fld>
             <a:endParaRPr lang="en-US"/>
           </a:p>
@@ -19219,7 +19219,7 @@
           <a:p>
             <a:fld id="{A643D7BA-99BF-4038-8F6C-FBBEE1A9CE38}" type="datetimeFigureOut">
               <a:rPr lang="en-US" smtClean="0"/>
-              <a:t>4/27/2019</a:t>
+              <a:t>2/28/2020</a:t>
             </a:fld>
             <a:endParaRPr lang="en-US"/>
           </a:p>
@@ -19480,7 +19480,7 @@
           <a:p>
             <a:fld id="{A643D7BA-99BF-4038-8F6C-FBBEE1A9CE38}" type="datetimeFigureOut">
               <a:rPr lang="en-US" smtClean="0"/>
-              <a:t>4/27/2019</a:t>
+              <a:t>2/28/2020</a:t>
             </a:fld>
             <a:endParaRPr lang="en-US"/>
           </a:p>
@@ -19906,7 +19906,7 @@
           <a:p>
             <a:fld id="{A643D7BA-99BF-4038-8F6C-FBBEE1A9CE38}" type="datetimeFigureOut">
               <a:rPr lang="en-US" smtClean="0"/>
-              <a:t>4/27/2019</a:t>
+              <a:t>2/28/2020</a:t>
             </a:fld>
             <a:endParaRPr lang="en-US"/>
           </a:p>
@@ -20452,7 +20452,7 @@
           <a:p>
             <a:fld id="{A643D7BA-99BF-4038-8F6C-FBBEE1A9CE38}" type="datetimeFigureOut">
               <a:rPr lang="en-US" smtClean="0"/>
-              <a:t>4/27/2019</a:t>
+              <a:t>2/28/2020</a:t>
             </a:fld>
             <a:endParaRPr lang="en-US"/>
           </a:p>
@@ -21283,7 +21283,7 @@
           <a:p>
             <a:fld id="{A643D7BA-99BF-4038-8F6C-FBBEE1A9CE38}" type="datetimeFigureOut">
               <a:rPr lang="en-US" smtClean="0"/>
-              <a:t>4/27/2019</a:t>
+              <a:t>2/28/2020</a:t>
             </a:fld>
             <a:endParaRPr lang="en-US"/>
           </a:p>
@@ -21453,7 +21453,7 @@
           <a:p>
             <a:fld id="{A643D7BA-99BF-4038-8F6C-FBBEE1A9CE38}" type="datetimeFigureOut">
               <a:rPr lang="en-US" smtClean="0"/>
-              <a:t>4/27/2019</a:t>
+              <a:t>2/28/2020</a:t>
             </a:fld>
             <a:endParaRPr lang="en-US"/>
           </a:p>
@@ -21633,7 +21633,7 @@
           <a:p>
             <a:fld id="{A643D7BA-99BF-4038-8F6C-FBBEE1A9CE38}" type="datetimeFigureOut">
               <a:rPr lang="en-US" smtClean="0"/>
-              <a:t>4/27/2019</a:t>
+              <a:t>2/28/2020</a:t>
             </a:fld>
             <a:endParaRPr lang="en-US"/>
           </a:p>
@@ -21896,7 +21896,7 @@
           <a:p>
             <a:fld id="{A643D7BA-99BF-4038-8F6C-FBBEE1A9CE38}" type="datetimeFigureOut">
               <a:rPr lang="en-US" smtClean="0"/>
-              <a:t>4/27/2019</a:t>
+              <a:t>2/28/2020</a:t>
             </a:fld>
             <a:endParaRPr lang="en-US"/>
           </a:p>
@@ -22161,7 +22161,7 @@
           <a:p>
             <a:fld id="{A643D7BA-99BF-4038-8F6C-FBBEE1A9CE38}" type="datetimeFigureOut">
               <a:rPr lang="en-US" smtClean="0"/>
-              <a:t>4/27/2019</a:t>
+              <a:t>2/28/2020</a:t>
             </a:fld>
             <a:endParaRPr lang="en-US"/>
           </a:p>
@@ -22573,7 +22573,7 @@
           <a:p>
             <a:fld id="{A643D7BA-99BF-4038-8F6C-FBBEE1A9CE38}" type="datetimeFigureOut">
               <a:rPr lang="en-US" smtClean="0"/>
-              <a:t>4/27/2019</a:t>
+              <a:t>2/28/2020</a:t>
             </a:fld>
             <a:endParaRPr lang="en-US"/>
           </a:p>
@@ -22714,7 +22714,7 @@
           <a:p>
             <a:fld id="{A643D7BA-99BF-4038-8F6C-FBBEE1A9CE38}" type="datetimeFigureOut">
               <a:rPr lang="en-US" smtClean="0"/>
-              <a:t>4/27/2019</a:t>
+              <a:t>2/28/2020</a:t>
             </a:fld>
             <a:endParaRPr lang="en-US"/>
           </a:p>
@@ -22827,7 +22827,7 @@
           <a:p>
             <a:fld id="{A643D7BA-99BF-4038-8F6C-FBBEE1A9CE38}" type="datetimeFigureOut">
               <a:rPr lang="en-US" smtClean="0"/>
-              <a:t>4/27/2019</a:t>
+              <a:t>2/28/2020</a:t>
             </a:fld>
             <a:endParaRPr lang="en-US"/>
           </a:p>
@@ -23138,7 +23138,7 @@
           <a:p>
             <a:fld id="{A643D7BA-99BF-4038-8F6C-FBBEE1A9CE38}" type="datetimeFigureOut">
               <a:rPr lang="en-US" smtClean="0"/>
-              <a:t>4/27/2019</a:t>
+              <a:t>2/28/2020</a:t>
             </a:fld>
             <a:endParaRPr lang="en-US"/>
           </a:p>
@@ -23426,7 +23426,7 @@
           <a:p>
             <a:fld id="{A643D7BA-99BF-4038-8F6C-FBBEE1A9CE38}" type="datetimeFigureOut">
               <a:rPr lang="en-US" smtClean="0"/>
-              <a:t>4/27/2019</a:t>
+              <a:t>2/28/2020</a:t>
             </a:fld>
             <a:endParaRPr lang="en-US"/>
           </a:p>
@@ -23667,7 +23667,7 @@
           <a:p>
             <a:fld id="{A643D7BA-99BF-4038-8F6C-FBBEE1A9CE38}" type="datetimeFigureOut">
               <a:rPr lang="en-US" smtClean="0"/>
-              <a:t>4/27/2019</a:t>
+              <a:t>2/28/2020</a:t>
             </a:fld>
             <a:endParaRPr lang="en-US"/>
           </a:p>
@@ -24246,7 +24246,7 @@
           <a:p>
             <a:fld id="{A643D7BA-99BF-4038-8F6C-FBBEE1A9CE38}" type="datetimeFigureOut">
               <a:rPr lang="en-US" smtClean="0"/>
-              <a:t>4/27/2019</a:t>
+              <a:t>2/28/2020</a:t>
             </a:fld>
             <a:endParaRPr lang="en-US"/>
           </a:p>
@@ -24949,7 +24949,6 @@
         <a:blipFill dpi="0" rotWithShape="1">
           <a:blip r:embed="rId2">
             <a:lum/>
-            <a:extLst/>
           </a:blip>
           <a:srcRect/>
           <a:stretch>
@@ -28907,7 +28906,6 @@
         <a:blipFill dpi="0" rotWithShape="1">
           <a:blip r:embed="rId2">
             <a:lum/>
-            <a:extLst/>
           </a:blip>
           <a:srcRect/>
           <a:stretch>
@@ -29337,7 +29335,6 @@
         <a:blipFill dpi="0" rotWithShape="1">
           <a:blip r:embed="rId2">
             <a:lum/>
-            <a:extLst/>
           </a:blip>
           <a:srcRect/>
           <a:stretch>
@@ -29581,7 +29578,6 @@
         <a:blipFill dpi="0" rotWithShape="1">
           <a:blip r:embed="rId2">
             <a:lum/>
-            <a:extLst/>
           </a:blip>
           <a:srcRect/>
           <a:stretch>
@@ -30250,7 +30246,6 @@
         <a:blipFill dpi="0" rotWithShape="1">
           <a:blip r:embed="rId2">
             <a:lum/>
-            <a:extLst/>
           </a:blip>
           <a:srcRect/>
           <a:stretch>
@@ -30932,8 +30927,8 @@
         </p:blipFill>
         <p:spPr>
           <a:xfrm>
-            <a:off x="3512507" y="6566141"/>
-            <a:ext cx="8760516" cy="407596"/>
+            <a:off x="1145754" y="6456023"/>
+            <a:ext cx="11127268" cy="517713"/>
           </a:xfrm>
           <a:prstGeom prst="rect">
             <a:avLst/>
@@ -31889,7 +31884,7 @@
                   <a:srgbClr val="000000"/>
                 </a:solidFill>
               </a:rPr>
-              <a:t>Cost reduction</a:t>
+              <a:t>Open source analogy - Cost reduction</a:t>
             </a:r>
           </a:p>
           <a:p>
@@ -32155,7 +32150,7 @@
             <p:ph idx="1"/>
             <p:extLst>
               <p:ext uri="{D42A27DB-BD31-4B8C-83A1-F6EECF244321}">
-                <p14:modId xmlns:p14="http://schemas.microsoft.com/office/powerpoint/2010/main" val="1330653886"/>
+                <p14:modId xmlns:p14="http://schemas.microsoft.com/office/powerpoint/2010/main" val="1331062705"/>
               </p:ext>
             </p:extLst>
           </p:nvPr>
@@ -32171,14 +32166,14 @@
                 <a:tableStyleId>{5C22544A-7EE6-4342-B048-85BDC9FD1C3A}</a:tableStyleId>
               </a:tblPr>
               <a:tblGrid>
-                <a:gridCol w="5078081">
+                <a:gridCol w="5278590">
                   <a:extLst>
                     <a:ext uri="{9D8B030D-6E8A-4147-A177-3AD203B41FA5}">
                       <a16:colId xmlns:a16="http://schemas.microsoft.com/office/drawing/2014/main" val="3774537429"/>
                     </a:ext>
                   </a:extLst>
                 </a:gridCol>
-                <a:gridCol w="4988256">
+                <a:gridCol w="4787747">
                   <a:extLst>
                     <a:ext uri="{9D8B030D-6E8A-4147-A177-3AD203B41FA5}">
                       <a16:colId xmlns:a16="http://schemas.microsoft.com/office/drawing/2014/main" val="3284872792"/>
@@ -32293,7 +32288,7 @@
                     <a:p>
                       <a:r>
                         <a:rPr lang="en-US" sz="1700" dirty="0"/>
-                        <a:t>Distributed processing. E.g. Twitter Hashtag search happen over 1000 servers, ok if miss some tweets due to unavailability of 1 of 60 nodes</a:t>
+                        <a:t>Distributed processing across commodity hardware.</a:t>
                       </a:r>
                     </a:p>
                   </a:txBody>
@@ -32306,8 +32301,13 @@
                     <a:p>
                       <a:r>
                         <a:rPr lang="en-US" sz="1700" dirty="0"/>
-                        <a:t>Two phase commit. Consistency across all nodes. Necessary in cases like, Transaction(Banks), Share market</a:t>
+                        <a:t>Centralized processing over high-end </a:t>
                       </a:r>
+                      <a:r>
+                        <a:rPr lang="en-US" sz="1700"/>
+                        <a:t>hardware.</a:t>
+                      </a:r>
+                      <a:endParaRPr lang="en-US" sz="1700" dirty="0"/>
                     </a:p>
                   </a:txBody>
                   <a:tcPr marL="86752" marR="86752" marT="43376" marB="43376"/>

</xml_diff>